<commit_message>
update to new link
</commit_message>
<xml_diff>
--- a/intro to web.pptx
+++ b/intro to web.pptx
@@ -216,7 +216,7 @@
           <a:p>
             <a:fld id="{7C28A56C-B7DC-4B0B-A28E-64830014DEAF}" type="datetimeFigureOut">
               <a:rPr lang="en-US" smtClean="0"/>
-              <a:t>2/7/2018</a:t>
+              <a:t>1/10/2022</a:t>
             </a:fld>
             <a:endParaRPr lang="en-US"/>
           </a:p>
@@ -280,38 +280,37 @@
           <a:p>
             <a:pPr lvl="0"/>
             <a:r>
-              <a:rPr lang="en-US" smtClean="0"/>
+              <a:rPr lang="en-US"/>
               <a:t>Edit Master text styles</a:t>
             </a:r>
           </a:p>
           <a:p>
             <a:pPr lvl="1"/>
             <a:r>
-              <a:rPr lang="en-US" smtClean="0"/>
+              <a:rPr lang="en-US"/>
               <a:t>Second level</a:t>
             </a:r>
           </a:p>
           <a:p>
             <a:pPr lvl="2"/>
             <a:r>
-              <a:rPr lang="en-US" smtClean="0"/>
+              <a:rPr lang="en-US"/>
               <a:t>Third level</a:t>
             </a:r>
           </a:p>
           <a:p>
             <a:pPr lvl="3"/>
             <a:r>
-              <a:rPr lang="en-US" smtClean="0"/>
+              <a:rPr lang="en-US"/>
               <a:t>Fourth level</a:t>
             </a:r>
           </a:p>
           <a:p>
             <a:pPr lvl="4"/>
             <a:r>
-              <a:rPr lang="en-US" smtClean="0"/>
+              <a:rPr lang="en-US"/>
               <a:t>Fifth level</a:t>
             </a:r>
-            <a:endParaRPr lang="en-US"/>
           </a:p>
         </p:txBody>
       </p:sp>
@@ -529,17 +528,17 @@
           <a:lstStyle/>
           <a:p>
             <a:r>
-              <a:rPr lang="en-US" dirty="0" smtClean="0"/>
+              <a:rPr lang="en-US" dirty="0"/>
               <a:t>For example, how</a:t>
             </a:r>
             <a:r>
-              <a:rPr lang="en-US" baseline="0" dirty="0" smtClean="0"/>
+              <a:rPr lang="en-US" baseline="0" dirty="0"/>
               <a:t> does a website like amazon exist? Amazon’s website is amazing, [buy] the way. Truly though, there are a lot of moving parts here, a lot of personalization based on data you have helped amazon create. The visual design of amazon is brilliantly designed to maximize your ease of making purchases that you want.</a:t>
             </a:r>
           </a:p>
           <a:p>
             <a:r>
-              <a:rPr lang="en-US" baseline="0" dirty="0" smtClean="0"/>
+              <a:rPr lang="en-US" baseline="0" dirty="0"/>
               <a:t>We won’t be deconstructing amazon here or certainly not attempting to replicate it. But this workshop will hopefully give you a sense about how the technologies here help put something like amazon together.</a:t>
             </a:r>
           </a:p>
@@ -626,11 +625,11 @@
           <a:lstStyle/>
           <a:p>
             <a:r>
-              <a:rPr lang="en-US" dirty="0" smtClean="0"/>
+              <a:rPr lang="en-US" dirty="0"/>
               <a:t>Just</a:t>
             </a:r>
             <a:r>
-              <a:rPr lang="en-US" baseline="0" dirty="0" smtClean="0"/>
+              <a:rPr lang="en-US" baseline="0" dirty="0"/>
               <a:t> a quick google search for “web technologies” can show you a lot about how complex web development is. All of these icons represent some sort of technology solution to some kind of problem that web developers face. Some of these might look familiar to you, others are perhaps too specific or proprietary.</a:t>
             </a:r>
             <a:endParaRPr lang="en-US" dirty="0"/>
@@ -862,49 +861,49 @@
           <a:lstStyle/>
           <a:p>
             <a:r>
-              <a:rPr lang="en-US" dirty="0" smtClean="0"/>
+              <a:rPr lang="en-US" dirty="0"/>
               <a:t>We will hit the basics</a:t>
             </a:r>
             <a:r>
-              <a:rPr lang="en-US" baseline="0" dirty="0" smtClean="0"/>
+              <a:rPr lang="en-US" baseline="0" dirty="0"/>
               <a:t> here. There is a lot to unpack, really. But we will start with these three technologies. In 5 years, these may change a little but the basics will most likely be the same.</a:t>
             </a:r>
           </a:p>
           <a:p>
             <a:r>
-              <a:rPr lang="en-US" baseline="0" dirty="0" smtClean="0"/>
+              <a:rPr lang="en-US" baseline="0" dirty="0"/>
               <a:t>We have HTML 5, </a:t>
             </a:r>
             <a:r>
-              <a:rPr lang="en-US" baseline="0" dirty="0" err="1" smtClean="0"/>
+              <a:rPr lang="en-US" baseline="0" dirty="0" err="1"/>
               <a:t>Javascript</a:t>
             </a:r>
             <a:r>
-              <a:rPr lang="en-US" baseline="0" dirty="0" smtClean="0"/>
+              <a:rPr lang="en-US" baseline="0" dirty="0"/>
               <a:t>, and CSS 3</a:t>
             </a:r>
           </a:p>
           <a:p>
             <a:r>
-              <a:rPr lang="en-US" baseline="0" dirty="0" smtClean="0"/>
+              <a:rPr lang="en-US" baseline="0" dirty="0"/>
               <a:t>HTML has been around since the beginning and CSS isn’t going anywhere either.</a:t>
             </a:r>
           </a:p>
           <a:p>
             <a:r>
-              <a:rPr lang="en-US" baseline="0" dirty="0" smtClean="0"/>
+              <a:rPr lang="en-US" baseline="0" dirty="0"/>
               <a:t>JavaScript has become a respectably robust and formidable development language in the past decade especially.</a:t>
             </a:r>
           </a:p>
           <a:p>
             <a:r>
-              <a:rPr lang="en-US" baseline="0" dirty="0" smtClean="0"/>
+              <a:rPr lang="en-US" baseline="0" dirty="0"/>
               <a:t>These technologies evolved out of a need for a ubiquitous and portable experience across the internet</a:t>
             </a:r>
           </a:p>
           <a:p>
             <a:r>
-              <a:rPr lang="en-US" baseline="0" dirty="0" smtClean="0"/>
+              <a:rPr lang="en-US" baseline="0" dirty="0"/>
               <a:t>One of the early problems that the web faced was a multitude of environments that any person might be on when they accessed the internet.</a:t>
             </a:r>
             <a:endParaRPr lang="en-US" dirty="0"/>
@@ -992,28 +991,28 @@
           <a:lstStyle/>
           <a:p>
             <a:r>
-              <a:rPr lang="en-US" dirty="0" smtClean="0"/>
+              <a:rPr lang="en-US" dirty="0"/>
               <a:t>Browsers interpret HTML, CSS, and JavaScript</a:t>
             </a:r>
           </a:p>
           <a:p>
             <a:r>
-              <a:rPr lang="en-US" dirty="0" smtClean="0"/>
+              <a:rPr lang="en-US" dirty="0"/>
               <a:t>Browsers simply</a:t>
             </a:r>
             <a:r>
-              <a:rPr lang="en-US" baseline="0" dirty="0" smtClean="0"/>
+              <a:rPr lang="en-US" baseline="0" dirty="0"/>
               <a:t> read the markup and display whatever the HTML and CSS says to</a:t>
             </a:r>
-            <a:endParaRPr lang="en-US" dirty="0" smtClean="0"/>
-          </a:p>
-          <a:p>
-            <a:r>
-              <a:rPr lang="en-US" dirty="0" smtClean="0"/>
+            <a:endParaRPr lang="en-US" dirty="0"/>
+          </a:p>
+          <a:p>
+            <a:r>
+              <a:rPr lang="en-US" dirty="0"/>
               <a:t>Despite this, uniformity</a:t>
             </a:r>
             <a:r>
-              <a:rPr lang="en-US" baseline="0" dirty="0" smtClean="0"/>
+              <a:rPr lang="en-US" baseline="0" dirty="0"/>
               <a:t> across browsers is still to this day a problem (although thankfully at least Explorer is now dying)</a:t>
             </a:r>
           </a:p>
@@ -1100,25 +1099,25 @@
           <a:lstStyle/>
           <a:p>
             <a:r>
-              <a:rPr lang="en-US" dirty="0" smtClean="0"/>
+              <a:rPr lang="en-US" dirty="0"/>
               <a:t>[Set</a:t>
             </a:r>
             <a:r>
-              <a:rPr lang="en-US" baseline="0" dirty="0" smtClean="0"/>
+              <a:rPr lang="en-US" baseline="0" dirty="0"/>
               <a:t> up dual screen: development environment is shown and these bullet points are meant to be read by the presenter on their own screen]</a:t>
             </a:r>
-            <a:endParaRPr lang="en-US" dirty="0" smtClean="0"/>
-          </a:p>
-          <a:p>
-            <a:r>
-              <a:rPr lang="en-US" dirty="0" smtClean="0"/>
+            <a:endParaRPr lang="en-US" dirty="0"/>
+          </a:p>
+          <a:p>
+            <a:r>
+              <a:rPr lang="en-US" dirty="0"/>
               <a:t>Now that I’ve talked a lot, I’ll show you how you can create a web page so</a:t>
             </a:r>
             <a:r>
-              <a:rPr lang="en-US" baseline="0" dirty="0" smtClean="0"/>
+              <a:rPr lang="en-US" baseline="0" dirty="0"/>
               <a:t> that you can see the components involved in their most basic form.</a:t>
             </a:r>
-            <a:endParaRPr lang="en-US" dirty="0" smtClean="0"/>
+            <a:endParaRPr lang="en-US" dirty="0"/>
           </a:p>
           <a:p>
             <a:endParaRPr lang="en-US" dirty="0"/>
@@ -1290,10 +1289,9 @@
           <a:lstStyle/>
           <a:p>
             <a:r>
-              <a:rPr lang="en-US" dirty="0" smtClean="0"/>
+              <a:rPr lang="en-US" dirty="0"/>
               <a:t>Ideally, 15 minutes for this</a:t>
             </a:r>
-            <a:endParaRPr lang="en-US" dirty="0"/>
           </a:p>
         </p:txBody>
       </p:sp>
@@ -1378,11 +1376,11 @@
           <a:lstStyle/>
           <a:p>
             <a:r>
-              <a:rPr lang="en-US" dirty="0" smtClean="0"/>
+              <a:rPr lang="en-US" dirty="0"/>
               <a:t>This should take</a:t>
             </a:r>
             <a:r>
-              <a:rPr lang="en-US" baseline="0" dirty="0" smtClean="0"/>
+              <a:rPr lang="en-US" baseline="0" dirty="0"/>
               <a:t> 5 minutes</a:t>
             </a:r>
             <a:endParaRPr lang="en-US" dirty="0"/>
@@ -1475,7 +1473,7 @@
           </a:lstStyle>
           <a:p>
             <a:r>
-              <a:rPr lang="en-US" smtClean="0"/>
+              <a:rPr lang="en-US"/>
               <a:t>Click to edit Master title style</a:t>
             </a:r>
             <a:endParaRPr lang="en-US" dirty="0"/>
@@ -1540,7 +1538,7 @@
           </a:lstStyle>
           <a:p>
             <a:r>
-              <a:rPr lang="en-US" smtClean="0"/>
+              <a:rPr lang="en-US"/>
               <a:t>Click to edit Master subtitle style</a:t>
             </a:r>
             <a:endParaRPr lang="en-US" dirty="0"/>
@@ -1564,7 +1562,7 @@
           <a:p>
             <a:fld id="{B417B79C-9BEE-4788-8A40-105E29A8A87D}" type="datetimeFigureOut">
               <a:rPr lang="en-US" smtClean="0"/>
-              <a:t>2/7/2018</a:t>
+              <a:t>1/10/2022</a:t>
             </a:fld>
             <a:endParaRPr lang="en-US"/>
           </a:p>
@@ -1666,7 +1664,7 @@
           <a:lstStyle/>
           <a:p>
             <a:r>
-              <a:rPr lang="en-US" smtClean="0"/>
+              <a:rPr lang="en-US"/>
               <a:t>Click to edit Master title style</a:t>
             </a:r>
             <a:endParaRPr lang="en-US" dirty="0"/>
@@ -1690,35 +1688,35 @@
           <a:p>
             <a:pPr lvl="0"/>
             <a:r>
-              <a:rPr lang="en-US" smtClean="0"/>
+              <a:rPr lang="en-US"/>
               <a:t>Edit Master text styles</a:t>
             </a:r>
           </a:p>
           <a:p>
             <a:pPr lvl="1"/>
             <a:r>
-              <a:rPr lang="en-US" smtClean="0"/>
+              <a:rPr lang="en-US"/>
               <a:t>Second level</a:t>
             </a:r>
           </a:p>
           <a:p>
             <a:pPr lvl="2"/>
             <a:r>
-              <a:rPr lang="en-US" smtClean="0"/>
+              <a:rPr lang="en-US"/>
               <a:t>Third level</a:t>
             </a:r>
           </a:p>
           <a:p>
             <a:pPr lvl="3"/>
             <a:r>
-              <a:rPr lang="en-US" smtClean="0"/>
+              <a:rPr lang="en-US"/>
               <a:t>Fourth level</a:t>
             </a:r>
           </a:p>
           <a:p>
             <a:pPr lvl="4"/>
             <a:r>
-              <a:rPr lang="en-US" smtClean="0"/>
+              <a:rPr lang="en-US"/>
               <a:t>Fifth level</a:t>
             </a:r>
             <a:endParaRPr lang="en-US" dirty="0"/>
@@ -1742,7 +1740,7 @@
           <a:p>
             <a:fld id="{B417B79C-9BEE-4788-8A40-105E29A8A87D}" type="datetimeFigureOut">
               <a:rPr lang="en-US" smtClean="0"/>
-              <a:t>2/7/2018</a:t>
+              <a:t>1/10/2022</a:t>
             </a:fld>
             <a:endParaRPr lang="en-US"/>
           </a:p>
@@ -1849,7 +1847,7 @@
           <a:lstStyle/>
           <a:p>
             <a:r>
-              <a:rPr lang="en-US" smtClean="0"/>
+              <a:rPr lang="en-US"/>
               <a:t>Click to edit Master title style</a:t>
             </a:r>
             <a:endParaRPr lang="en-US" dirty="0"/>
@@ -1878,35 +1876,35 @@
           <a:p>
             <a:pPr lvl="0"/>
             <a:r>
-              <a:rPr lang="en-US" smtClean="0"/>
+              <a:rPr lang="en-US"/>
               <a:t>Edit Master text styles</a:t>
             </a:r>
           </a:p>
           <a:p>
             <a:pPr lvl="1"/>
             <a:r>
-              <a:rPr lang="en-US" smtClean="0"/>
+              <a:rPr lang="en-US"/>
               <a:t>Second level</a:t>
             </a:r>
           </a:p>
           <a:p>
             <a:pPr lvl="2"/>
             <a:r>
-              <a:rPr lang="en-US" smtClean="0"/>
+              <a:rPr lang="en-US"/>
               <a:t>Third level</a:t>
             </a:r>
           </a:p>
           <a:p>
             <a:pPr lvl="3"/>
             <a:r>
-              <a:rPr lang="en-US" smtClean="0"/>
+              <a:rPr lang="en-US"/>
               <a:t>Fourth level</a:t>
             </a:r>
           </a:p>
           <a:p>
             <a:pPr lvl="4"/>
             <a:r>
-              <a:rPr lang="en-US" smtClean="0"/>
+              <a:rPr lang="en-US"/>
               <a:t>Fifth level</a:t>
             </a:r>
             <a:endParaRPr lang="en-US" dirty="0"/>
@@ -1930,7 +1928,7 @@
           <a:p>
             <a:fld id="{B417B79C-9BEE-4788-8A40-105E29A8A87D}" type="datetimeFigureOut">
               <a:rPr lang="en-US" smtClean="0"/>
-              <a:t>2/7/2018</a:t>
+              <a:t>1/10/2022</a:t>
             </a:fld>
             <a:endParaRPr lang="en-US"/>
           </a:p>
@@ -2032,7 +2030,7 @@
           <a:lstStyle/>
           <a:p>
             <a:r>
-              <a:rPr lang="en-US" smtClean="0"/>
+              <a:rPr lang="en-US"/>
               <a:t>Click to edit Master title style</a:t>
             </a:r>
             <a:endParaRPr lang="en-US" dirty="0"/>
@@ -2056,35 +2054,35 @@
           <a:p>
             <a:pPr lvl="0"/>
             <a:r>
-              <a:rPr lang="en-US" smtClean="0"/>
+              <a:rPr lang="en-US"/>
               <a:t>Edit Master text styles</a:t>
             </a:r>
           </a:p>
           <a:p>
             <a:pPr lvl="1"/>
             <a:r>
-              <a:rPr lang="en-US" smtClean="0"/>
+              <a:rPr lang="en-US"/>
               <a:t>Second level</a:t>
             </a:r>
           </a:p>
           <a:p>
             <a:pPr lvl="2"/>
             <a:r>
-              <a:rPr lang="en-US" smtClean="0"/>
+              <a:rPr lang="en-US"/>
               <a:t>Third level</a:t>
             </a:r>
           </a:p>
           <a:p>
             <a:pPr lvl="3"/>
             <a:r>
-              <a:rPr lang="en-US" smtClean="0"/>
+              <a:rPr lang="en-US"/>
               <a:t>Fourth level</a:t>
             </a:r>
           </a:p>
           <a:p>
             <a:pPr lvl="4"/>
             <a:r>
-              <a:rPr lang="en-US" smtClean="0"/>
+              <a:rPr lang="en-US"/>
               <a:t>Fifth level</a:t>
             </a:r>
             <a:endParaRPr lang="en-US" dirty="0"/>
@@ -2108,7 +2106,7 @@
           <a:p>
             <a:fld id="{B417B79C-9BEE-4788-8A40-105E29A8A87D}" type="datetimeFigureOut">
               <a:rPr lang="en-US" smtClean="0"/>
-              <a:t>2/7/2018</a:t>
+              <a:t>1/10/2022</a:t>
             </a:fld>
             <a:endParaRPr lang="en-US"/>
           </a:p>
@@ -2219,7 +2217,7 @@
           </a:lstStyle>
           <a:p>
             <a:r>
-              <a:rPr lang="en-US" smtClean="0"/>
+              <a:rPr lang="en-US"/>
               <a:t>Click to edit Master title style</a:t>
             </a:r>
             <a:endParaRPr lang="en-US" dirty="0"/>
@@ -2339,7 +2337,7 @@
           <a:p>
             <a:pPr lvl="0"/>
             <a:r>
-              <a:rPr lang="en-US" smtClean="0"/>
+              <a:rPr lang="en-US"/>
               <a:t>Edit Master text styles</a:t>
             </a:r>
           </a:p>
@@ -2362,7 +2360,7 @@
           <a:p>
             <a:fld id="{B417B79C-9BEE-4788-8A40-105E29A8A87D}" type="datetimeFigureOut">
               <a:rPr lang="en-US" smtClean="0"/>
-              <a:t>2/7/2018</a:t>
+              <a:t>1/10/2022</a:t>
             </a:fld>
             <a:endParaRPr lang="en-US"/>
           </a:p>
@@ -2464,7 +2462,7 @@
           <a:lstStyle/>
           <a:p>
             <a:r>
-              <a:rPr lang="en-US" smtClean="0"/>
+              <a:rPr lang="en-US"/>
               <a:t>Click to edit Master title style</a:t>
             </a:r>
             <a:endParaRPr lang="en-US" dirty="0"/>
@@ -2493,35 +2491,35 @@
           <a:p>
             <a:pPr lvl="0"/>
             <a:r>
-              <a:rPr lang="en-US" smtClean="0"/>
+              <a:rPr lang="en-US"/>
               <a:t>Edit Master text styles</a:t>
             </a:r>
           </a:p>
           <a:p>
             <a:pPr lvl="1"/>
             <a:r>
-              <a:rPr lang="en-US" smtClean="0"/>
+              <a:rPr lang="en-US"/>
               <a:t>Second level</a:t>
             </a:r>
           </a:p>
           <a:p>
             <a:pPr lvl="2"/>
             <a:r>
-              <a:rPr lang="en-US" smtClean="0"/>
+              <a:rPr lang="en-US"/>
               <a:t>Third level</a:t>
             </a:r>
           </a:p>
           <a:p>
             <a:pPr lvl="3"/>
             <a:r>
-              <a:rPr lang="en-US" smtClean="0"/>
+              <a:rPr lang="en-US"/>
               <a:t>Fourth level</a:t>
             </a:r>
           </a:p>
           <a:p>
             <a:pPr lvl="4"/>
             <a:r>
-              <a:rPr lang="en-US" smtClean="0"/>
+              <a:rPr lang="en-US"/>
               <a:t>Fifth level</a:t>
             </a:r>
             <a:endParaRPr lang="en-US" dirty="0"/>
@@ -2550,35 +2548,35 @@
           <a:p>
             <a:pPr lvl="0"/>
             <a:r>
-              <a:rPr lang="en-US" smtClean="0"/>
+              <a:rPr lang="en-US"/>
               <a:t>Edit Master text styles</a:t>
             </a:r>
           </a:p>
           <a:p>
             <a:pPr lvl="1"/>
             <a:r>
-              <a:rPr lang="en-US" smtClean="0"/>
+              <a:rPr lang="en-US"/>
               <a:t>Second level</a:t>
             </a:r>
           </a:p>
           <a:p>
             <a:pPr lvl="2"/>
             <a:r>
-              <a:rPr lang="en-US" smtClean="0"/>
+              <a:rPr lang="en-US"/>
               <a:t>Third level</a:t>
             </a:r>
           </a:p>
           <a:p>
             <a:pPr lvl="3"/>
             <a:r>
-              <a:rPr lang="en-US" smtClean="0"/>
+              <a:rPr lang="en-US"/>
               <a:t>Fourth level</a:t>
             </a:r>
           </a:p>
           <a:p>
             <a:pPr lvl="4"/>
             <a:r>
-              <a:rPr lang="en-US" smtClean="0"/>
+              <a:rPr lang="en-US"/>
               <a:t>Fifth level</a:t>
             </a:r>
             <a:endParaRPr lang="en-US" dirty="0"/>
@@ -2602,7 +2600,7 @@
           <a:p>
             <a:fld id="{B417B79C-9BEE-4788-8A40-105E29A8A87D}" type="datetimeFigureOut">
               <a:rPr lang="en-US" smtClean="0"/>
-              <a:t>2/7/2018</a:t>
+              <a:t>1/10/2022</a:t>
             </a:fld>
             <a:endParaRPr lang="en-US"/>
           </a:p>
@@ -2709,7 +2707,7 @@
           <a:lstStyle/>
           <a:p>
             <a:r>
-              <a:rPr lang="en-US" smtClean="0"/>
+              <a:rPr lang="en-US"/>
               <a:t>Click to edit Master title style</a:t>
             </a:r>
             <a:endParaRPr lang="en-US" dirty="0"/>
@@ -2775,7 +2773,7 @@
           <a:p>
             <a:pPr lvl="0"/>
             <a:r>
-              <a:rPr lang="en-US" smtClean="0"/>
+              <a:rPr lang="en-US"/>
               <a:t>Edit Master text styles</a:t>
             </a:r>
           </a:p>
@@ -2803,35 +2801,35 @@
           <a:p>
             <a:pPr lvl="0"/>
             <a:r>
-              <a:rPr lang="en-US" smtClean="0"/>
+              <a:rPr lang="en-US"/>
               <a:t>Edit Master text styles</a:t>
             </a:r>
           </a:p>
           <a:p>
             <a:pPr lvl="1"/>
             <a:r>
-              <a:rPr lang="en-US" smtClean="0"/>
+              <a:rPr lang="en-US"/>
               <a:t>Second level</a:t>
             </a:r>
           </a:p>
           <a:p>
             <a:pPr lvl="2"/>
             <a:r>
-              <a:rPr lang="en-US" smtClean="0"/>
+              <a:rPr lang="en-US"/>
               <a:t>Third level</a:t>
             </a:r>
           </a:p>
           <a:p>
             <a:pPr lvl="3"/>
             <a:r>
-              <a:rPr lang="en-US" smtClean="0"/>
+              <a:rPr lang="en-US"/>
               <a:t>Fourth level</a:t>
             </a:r>
           </a:p>
           <a:p>
             <a:pPr lvl="4"/>
             <a:r>
-              <a:rPr lang="en-US" smtClean="0"/>
+              <a:rPr lang="en-US"/>
               <a:t>Fifth level</a:t>
             </a:r>
             <a:endParaRPr lang="en-US" dirty="0"/>
@@ -2897,7 +2895,7 @@
           <a:p>
             <a:pPr lvl="0"/>
             <a:r>
-              <a:rPr lang="en-US" smtClean="0"/>
+              <a:rPr lang="en-US"/>
               <a:t>Edit Master text styles</a:t>
             </a:r>
           </a:p>
@@ -2925,35 +2923,35 @@
           <a:p>
             <a:pPr lvl="0"/>
             <a:r>
-              <a:rPr lang="en-US" smtClean="0"/>
+              <a:rPr lang="en-US"/>
               <a:t>Edit Master text styles</a:t>
             </a:r>
           </a:p>
           <a:p>
             <a:pPr lvl="1"/>
             <a:r>
-              <a:rPr lang="en-US" smtClean="0"/>
+              <a:rPr lang="en-US"/>
               <a:t>Second level</a:t>
             </a:r>
           </a:p>
           <a:p>
             <a:pPr lvl="2"/>
             <a:r>
-              <a:rPr lang="en-US" smtClean="0"/>
+              <a:rPr lang="en-US"/>
               <a:t>Third level</a:t>
             </a:r>
           </a:p>
           <a:p>
             <a:pPr lvl="3"/>
             <a:r>
-              <a:rPr lang="en-US" smtClean="0"/>
+              <a:rPr lang="en-US"/>
               <a:t>Fourth level</a:t>
             </a:r>
           </a:p>
           <a:p>
             <a:pPr lvl="4"/>
             <a:r>
-              <a:rPr lang="en-US" smtClean="0"/>
+              <a:rPr lang="en-US"/>
               <a:t>Fifth level</a:t>
             </a:r>
             <a:endParaRPr lang="en-US" dirty="0"/>
@@ -2977,7 +2975,7 @@
           <a:p>
             <a:fld id="{B417B79C-9BEE-4788-8A40-105E29A8A87D}" type="datetimeFigureOut">
               <a:rPr lang="en-US" smtClean="0"/>
-              <a:t>2/7/2018</a:t>
+              <a:t>1/10/2022</a:t>
             </a:fld>
             <a:endParaRPr lang="en-US"/>
           </a:p>
@@ -3079,7 +3077,7 @@
           <a:lstStyle/>
           <a:p>
             <a:r>
-              <a:rPr lang="en-US" smtClean="0"/>
+              <a:rPr lang="en-US"/>
               <a:t>Click to edit Master title style</a:t>
             </a:r>
             <a:endParaRPr lang="en-US" dirty="0"/>
@@ -3103,7 +3101,7 @@
           <a:p>
             <a:fld id="{B417B79C-9BEE-4788-8A40-105E29A8A87D}" type="datetimeFigureOut">
               <a:rPr lang="en-US" smtClean="0"/>
-              <a:t>2/7/2018</a:t>
+              <a:t>1/10/2022</a:t>
             </a:fld>
             <a:endParaRPr lang="en-US"/>
           </a:p>
@@ -3206,7 +3204,7 @@
           <a:p>
             <a:fld id="{B417B79C-9BEE-4788-8A40-105E29A8A87D}" type="datetimeFigureOut">
               <a:rPr lang="en-US" smtClean="0"/>
-              <a:t>2/7/2018</a:t>
+              <a:t>1/10/2022</a:t>
             </a:fld>
             <a:endParaRPr lang="en-US"/>
           </a:p>
@@ -3317,7 +3315,7 @@
           </a:lstStyle>
           <a:p>
             <a:r>
-              <a:rPr lang="en-US" smtClean="0"/>
+              <a:rPr lang="en-US"/>
               <a:t>Click to edit Master title style</a:t>
             </a:r>
             <a:endParaRPr lang="en-US" dirty="0"/>
@@ -3374,35 +3372,35 @@
           <a:p>
             <a:pPr lvl="0"/>
             <a:r>
-              <a:rPr lang="en-US" smtClean="0"/>
+              <a:rPr lang="en-US"/>
               <a:t>Edit Master text styles</a:t>
             </a:r>
           </a:p>
           <a:p>
             <a:pPr lvl="1"/>
             <a:r>
-              <a:rPr lang="en-US" smtClean="0"/>
+              <a:rPr lang="en-US"/>
               <a:t>Second level</a:t>
             </a:r>
           </a:p>
           <a:p>
             <a:pPr lvl="2"/>
             <a:r>
-              <a:rPr lang="en-US" smtClean="0"/>
+              <a:rPr lang="en-US"/>
               <a:t>Third level</a:t>
             </a:r>
           </a:p>
           <a:p>
             <a:pPr lvl="3"/>
             <a:r>
-              <a:rPr lang="en-US" smtClean="0"/>
+              <a:rPr lang="en-US"/>
               <a:t>Fourth level</a:t>
             </a:r>
           </a:p>
           <a:p>
             <a:pPr lvl="4"/>
             <a:r>
-              <a:rPr lang="en-US" smtClean="0"/>
+              <a:rPr lang="en-US"/>
               <a:t>Fifth level</a:t>
             </a:r>
             <a:endParaRPr lang="en-US" dirty="0"/>
@@ -3468,7 +3466,7 @@
           <a:p>
             <a:pPr lvl="0"/>
             <a:r>
-              <a:rPr lang="en-US" smtClean="0"/>
+              <a:rPr lang="en-US"/>
               <a:t>Edit Master text styles</a:t>
             </a:r>
           </a:p>
@@ -3491,7 +3489,7 @@
           <a:p>
             <a:fld id="{B417B79C-9BEE-4788-8A40-105E29A8A87D}" type="datetimeFigureOut">
               <a:rPr lang="en-US" smtClean="0"/>
-              <a:t>2/7/2018</a:t>
+              <a:t>1/10/2022</a:t>
             </a:fld>
             <a:endParaRPr lang="en-US"/>
           </a:p>
@@ -3602,7 +3600,7 @@
           </a:lstStyle>
           <a:p>
             <a:r>
-              <a:rPr lang="en-US" smtClean="0"/>
+              <a:rPr lang="en-US"/>
               <a:t>Click to edit Master title style</a:t>
             </a:r>
             <a:endParaRPr lang="en-US" dirty="0"/>
@@ -3667,7 +3665,7 @@
           </a:lstStyle>
           <a:p>
             <a:r>
-              <a:rPr lang="en-US" smtClean="0"/>
+              <a:rPr lang="en-US"/>
               <a:t>Click icon to add picture</a:t>
             </a:r>
             <a:endParaRPr lang="en-US" dirty="0"/>
@@ -3733,7 +3731,7 @@
           <a:p>
             <a:pPr lvl="0"/>
             <a:r>
-              <a:rPr lang="en-US" smtClean="0"/>
+              <a:rPr lang="en-US"/>
               <a:t>Edit Master text styles</a:t>
             </a:r>
           </a:p>
@@ -3756,7 +3754,7 @@
           <a:p>
             <a:fld id="{B417B79C-9BEE-4788-8A40-105E29A8A87D}" type="datetimeFigureOut">
               <a:rPr lang="en-US" smtClean="0"/>
-              <a:t>2/7/2018</a:t>
+              <a:t>1/10/2022</a:t>
             </a:fld>
             <a:endParaRPr lang="en-US"/>
           </a:p>
@@ -3868,7 +3866,7 @@
           <a:lstStyle/>
           <a:p>
             <a:r>
-              <a:rPr lang="en-US" smtClean="0"/>
+              <a:rPr lang="en-US"/>
               <a:t>Click to edit Master title style</a:t>
             </a:r>
             <a:endParaRPr lang="en-US" dirty="0"/>
@@ -3902,35 +3900,35 @@
           <a:p>
             <a:pPr lvl="0"/>
             <a:r>
-              <a:rPr lang="en-US" smtClean="0"/>
+              <a:rPr lang="en-US"/>
               <a:t>Edit Master text styles</a:t>
             </a:r>
           </a:p>
           <a:p>
             <a:pPr lvl="1"/>
             <a:r>
-              <a:rPr lang="en-US" smtClean="0"/>
+              <a:rPr lang="en-US"/>
               <a:t>Second level</a:t>
             </a:r>
           </a:p>
           <a:p>
             <a:pPr lvl="2"/>
             <a:r>
-              <a:rPr lang="en-US" smtClean="0"/>
+              <a:rPr lang="en-US"/>
               <a:t>Third level</a:t>
             </a:r>
           </a:p>
           <a:p>
             <a:pPr lvl="3"/>
             <a:r>
-              <a:rPr lang="en-US" smtClean="0"/>
+              <a:rPr lang="en-US"/>
               <a:t>Fourth level</a:t>
             </a:r>
           </a:p>
           <a:p>
             <a:pPr lvl="4"/>
             <a:r>
-              <a:rPr lang="en-US" smtClean="0"/>
+              <a:rPr lang="en-US"/>
               <a:t>Fifth level</a:t>
             </a:r>
             <a:endParaRPr lang="en-US" dirty="0"/>
@@ -3972,7 +3970,7 @@
           <a:p>
             <a:fld id="{B417B79C-9BEE-4788-8A40-105E29A8A87D}" type="datetimeFigureOut">
               <a:rPr lang="en-US" smtClean="0"/>
-              <a:t>2/7/2018</a:t>
+              <a:t>1/10/2022</a:t>
             </a:fld>
             <a:endParaRPr lang="en-US"/>
           </a:p>
@@ -4395,18 +4393,14 @@
           <a:lstStyle/>
           <a:p>
             <a:r>
-              <a:rPr lang="en-US" sz="4800" dirty="0" smtClean="0"/>
+              <a:rPr lang="en-US" sz="4800" dirty="0"/>
               <a:t>Unlocking the mysteries of</a:t>
             </a:r>
-            <a:r>
-              <a:rPr lang="en-US" sz="4900" dirty="0" smtClean="0"/>
-              <a:t/>
-            </a:r>
             <a:br>
-              <a:rPr lang="en-US" sz="4900" dirty="0" smtClean="0"/>
+              <a:rPr lang="en-US" sz="4900" dirty="0"/>
             </a:br>
             <a:r>
-              <a:rPr lang="en-US" sz="8000" b="1" dirty="0" smtClean="0"/>
+              <a:rPr lang="en-US" sz="8000" b="1" dirty="0"/>
               <a:t>Web Technology</a:t>
             </a:r>
             <a:endParaRPr lang="en-US" sz="6700" b="1" dirty="0"/>
@@ -4429,10 +4423,9 @@
           <a:lstStyle/>
           <a:p>
             <a:r>
-              <a:rPr lang="en-US" dirty="0" smtClean="0"/>
+              <a:rPr lang="en-US" dirty="0"/>
               <a:t>An introductory workshop on the basic components of a webpage</a:t>
             </a:r>
-            <a:endParaRPr lang="en-US" dirty="0"/>
           </a:p>
         </p:txBody>
       </p:sp>
@@ -4482,10 +4475,9 @@
           <a:lstStyle/>
           <a:p>
             <a:r>
-              <a:rPr lang="en-US" dirty="0" smtClean="0"/>
+              <a:rPr lang="en-US" dirty="0"/>
               <a:t>CSS Basics</a:t>
             </a:r>
-            <a:endParaRPr lang="en-US" dirty="0"/>
           </a:p>
         </p:txBody>
       </p:sp>
@@ -4506,19 +4498,14 @@
           <a:p>
             <a:r>
               <a:rPr lang="en-US" dirty="0"/>
-              <a:t>Manipulating the style of an element </a:t>
-            </a:r>
-            <a:r>
-              <a:rPr lang="en-US" dirty="0" smtClean="0"/>
-              <a:t>directly</a:t>
-            </a:r>
-          </a:p>
-          <a:p>
-            <a:r>
-              <a:rPr lang="en-US" dirty="0" smtClean="0"/>
+              <a:t>Manipulating the style of an element directly</a:t>
+            </a:r>
+          </a:p>
+          <a:p>
+            <a:r>
+              <a:rPr lang="en-US" dirty="0"/>
               <a:t>Discussing why styling is best when applied broadly</a:t>
             </a:r>
-            <a:endParaRPr lang="en-US" dirty="0"/>
           </a:p>
           <a:p>
             <a:r>
@@ -4542,31 +4529,26 @@
             </a:r>
             <a:r>
               <a:rPr lang="en-US" dirty="0"/>
-              <a:t> </a:t>
-            </a:r>
-            <a:r>
-              <a:rPr lang="en-US" dirty="0" smtClean="0"/>
-              <a:t>file</a:t>
-            </a:r>
-          </a:p>
-          <a:p>
-            <a:r>
-              <a:rPr lang="en-US" dirty="0" smtClean="0"/>
+              <a:t> file</a:t>
+            </a:r>
+          </a:p>
+          <a:p>
+            <a:r>
+              <a:rPr lang="en-US" dirty="0"/>
               <a:t>Discussion about why all of these options exist</a:t>
             </a:r>
           </a:p>
           <a:p>
             <a:r>
-              <a:rPr lang="en-US" dirty="0" smtClean="0"/>
+              <a:rPr lang="en-US" dirty="0"/>
               <a:t>Showing a hover element</a:t>
             </a:r>
           </a:p>
           <a:p>
             <a:r>
-              <a:rPr lang="en-US" dirty="0" smtClean="0"/>
+              <a:rPr lang="en-US" dirty="0"/>
               <a:t>Explaining what CSS stands for and what its purpose is</a:t>
             </a:r>
-            <a:endParaRPr lang="en-US" dirty="0"/>
           </a:p>
         </p:txBody>
       </p:sp>
@@ -4616,63 +4598,62 @@
           <a:lstStyle/>
           <a:p>
             <a:r>
-              <a:rPr lang="en-US" dirty="0" smtClean="0"/>
+              <a:rPr lang="en-US" dirty="0"/>
               <a:t>CSS Basics 2.0</a:t>
             </a:r>
+          </a:p>
+        </p:txBody>
+      </p:sp>
+      <p:sp>
+        <p:nvSpPr>
+          <p:cNvPr id="3" name="Content Placeholder 2"/>
+          <p:cNvSpPr>
+            <a:spLocks noGrp="1"/>
+          </p:cNvSpPr>
+          <p:nvPr>
+            <p:ph idx="1"/>
+          </p:nvPr>
+        </p:nvSpPr>
+        <p:spPr/>
+        <p:txBody>
+          <a:bodyPr/>
+          <a:lstStyle/>
+          <a:p>
+            <a:r>
+              <a:rPr lang="en-US" dirty="0"/>
+              <a:t>All in one file: explain each element, one at a time</a:t>
+            </a:r>
+          </a:p>
+          <a:p>
+            <a:r>
+              <a:rPr lang="en-US" dirty="0"/>
+              <a:t>Showing how the cascading works: parent is styled one way and the child is also styled</a:t>
+            </a:r>
+          </a:p>
+          <a:p>
+            <a:r>
+              <a:rPr lang="en-US" dirty="0"/>
+              <a:t>Showing how child with different styling will not inherit</a:t>
+            </a:r>
+          </a:p>
+          <a:p>
+            <a:r>
+              <a:rPr lang="en-US" dirty="0"/>
+              <a:t>Showing how an in-line styling overrides the </a:t>
+            </a:r>
+            <a:r>
+              <a:rPr lang="en-US" dirty="0" err="1"/>
+              <a:t>css</a:t>
+            </a:r>
             <a:endParaRPr lang="en-US" dirty="0"/>
           </a:p>
-        </p:txBody>
-      </p:sp>
-      <p:sp>
-        <p:nvSpPr>
-          <p:cNvPr id="3" name="Content Placeholder 2"/>
-          <p:cNvSpPr>
-            <a:spLocks noGrp="1"/>
-          </p:cNvSpPr>
-          <p:nvPr>
-            <p:ph idx="1"/>
-          </p:nvPr>
-        </p:nvSpPr>
-        <p:spPr/>
-        <p:txBody>
-          <a:bodyPr/>
-          <a:lstStyle/>
-          <a:p>
-            <a:r>
-              <a:rPr lang="en-US" dirty="0" smtClean="0"/>
-              <a:t>All in one file: explain each element, one at a time</a:t>
-            </a:r>
-          </a:p>
-          <a:p>
-            <a:r>
-              <a:rPr lang="en-US" dirty="0" smtClean="0"/>
-              <a:t>Showing how the cascading works: parent is styled one way and the child is also styled</a:t>
-            </a:r>
-          </a:p>
-          <a:p>
-            <a:r>
-              <a:rPr lang="en-US" dirty="0" smtClean="0"/>
-              <a:t>Showing how child with different styling will not inherit</a:t>
-            </a:r>
-          </a:p>
-          <a:p>
-            <a:r>
-              <a:rPr lang="en-US" dirty="0" smtClean="0"/>
-              <a:t>Showing how an in-line styling overrides the </a:t>
-            </a:r>
-            <a:r>
-              <a:rPr lang="en-US" dirty="0" err="1" smtClean="0"/>
-              <a:t>css</a:t>
-            </a:r>
-            <a:endParaRPr lang="en-US" dirty="0" smtClean="0"/>
-          </a:p>
-          <a:p>
-            <a:r>
-              <a:rPr lang="en-US" dirty="0" smtClean="0"/>
+          <a:p>
+            <a:r>
+              <a:rPr lang="en-US" dirty="0"/>
               <a:t>Showing how an ID element overrides the </a:t>
             </a:r>
             <a:r>
-              <a:rPr lang="en-US" dirty="0" err="1" smtClean="0"/>
+              <a:rPr lang="en-US" dirty="0" err="1"/>
               <a:t>css</a:t>
             </a:r>
             <a:endParaRPr lang="en-US" dirty="0"/>
@@ -4725,10 +4706,9 @@
           <a:lstStyle/>
           <a:p>
             <a:r>
-              <a:rPr lang="en-US" dirty="0" smtClean="0"/>
+              <a:rPr lang="en-US" dirty="0"/>
               <a:t>Challenge #1</a:t>
             </a:r>
-            <a:endParaRPr lang="en-US" dirty="0"/>
           </a:p>
         </p:txBody>
       </p:sp>
@@ -4753,83 +4733,83 @@
           <a:lstStyle/>
           <a:p>
             <a:r>
-              <a:rPr lang="en-US" dirty="0" smtClean="0"/>
+              <a:rPr lang="en-US" dirty="0"/>
               <a:t>Build a 250x250 pixel element with a 150x150 pixel element inside</a:t>
             </a:r>
           </a:p>
           <a:p>
             <a:pPr lvl="1"/>
             <a:r>
-              <a:rPr lang="en-US" dirty="0" smtClean="0"/>
+              <a:rPr lang="en-US" dirty="0"/>
               <a:t>Tip: Try using a “div” element &lt;div&gt;, give them borders so we can see</a:t>
             </a:r>
           </a:p>
           <a:p>
             <a:r>
-              <a:rPr lang="en-US" dirty="0" smtClean="0"/>
+              <a:rPr lang="en-US" dirty="0"/>
               <a:t>Style these using a CSS document, not inline or &lt;style&gt; HTML</a:t>
             </a:r>
           </a:p>
           <a:p>
             <a:pPr lvl="1"/>
             <a:r>
-              <a:rPr lang="en-US" dirty="0" smtClean="0"/>
+              <a:rPr lang="en-US" dirty="0"/>
               <a:t>Use classes, not IDs to accomplish this</a:t>
             </a:r>
           </a:p>
           <a:p>
             <a:r>
-              <a:rPr lang="en-US" dirty="0" smtClean="0"/>
+              <a:rPr lang="en-US" dirty="0"/>
               <a:t>Make the 250 pixel element change color on hover and the 150 pixel element change grow larger on hover</a:t>
             </a:r>
           </a:p>
           <a:p>
             <a:r>
-              <a:rPr lang="en-US" dirty="0" smtClean="0"/>
+              <a:rPr lang="en-US" dirty="0"/>
               <a:t>Bonus:</a:t>
             </a:r>
           </a:p>
           <a:p>
             <a:pPr lvl="1"/>
             <a:r>
-              <a:rPr lang="en-US" dirty="0" smtClean="0"/>
+              <a:rPr lang="en-US" dirty="0"/>
               <a:t>Make the first element’s </a:t>
             </a:r>
             <a:r>
-              <a:rPr lang="en-US" i="1" dirty="0" smtClean="0"/>
+              <a:rPr lang="en-US" i="1" dirty="0"/>
               <a:t>maximum</a:t>
             </a:r>
             <a:r>
-              <a:rPr lang="en-US" dirty="0" smtClean="0"/>
+              <a:rPr lang="en-US" dirty="0"/>
               <a:t> size 500 and </a:t>
             </a:r>
             <a:r>
-              <a:rPr lang="en-US" i="1" dirty="0" smtClean="0"/>
+              <a:rPr lang="en-US" i="1" dirty="0"/>
               <a:t>minimum </a:t>
             </a:r>
             <a:r>
-              <a:rPr lang="en-US" dirty="0" smtClean="0"/>
+              <a:rPr lang="en-US" dirty="0"/>
               <a:t>250 </a:t>
             </a:r>
             <a:r>
-              <a:rPr lang="en-US" i="1" dirty="0" smtClean="0"/>
+              <a:rPr lang="en-US" i="1" dirty="0"/>
               <a:t>-</a:t>
             </a:r>
             <a:r>
-              <a:rPr lang="en-US" dirty="0" smtClean="0"/>
+              <a:rPr lang="en-US" dirty="0"/>
               <a:t> it will shrink in size if the browser shrinks in size (this is called responsive design)</a:t>
             </a:r>
           </a:p>
           <a:p>
             <a:pPr lvl="1"/>
             <a:r>
-              <a:rPr lang="en-US" dirty="0" smtClean="0"/>
+              <a:rPr lang="en-US" dirty="0"/>
               <a:t>Make the inner element’s size a % of the outer element</a:t>
             </a:r>
           </a:p>
           <a:p>
             <a:r>
-              <a:rPr lang="en-US" dirty="0" smtClean="0"/>
+              <a:rPr lang="en-US" dirty="0"/>
               <a:t>Solution is included in folder “answers”</a:t>
             </a:r>
           </a:p>
@@ -4884,10 +4864,9 @@
           <a:lstStyle/>
           <a:p>
             <a:r>
-              <a:rPr lang="en-US" dirty="0" smtClean="0"/>
+              <a:rPr lang="en-US" dirty="0"/>
               <a:t>Scraping Basics</a:t>
             </a:r>
-            <a:endParaRPr lang="en-US" dirty="0"/>
           </a:p>
         </p:txBody>
       </p:sp>
@@ -4907,38 +4886,37 @@
           <a:lstStyle/>
           <a:p>
             <a:r>
-              <a:rPr lang="en-US" dirty="0" smtClean="0"/>
+              <a:rPr lang="en-US" dirty="0"/>
               <a:t>Showing how easy it is to “extract” html data</a:t>
             </a:r>
           </a:p>
           <a:p>
             <a:r>
-              <a:rPr lang="en-US" dirty="0" smtClean="0"/>
+              <a:rPr lang="en-US" dirty="0"/>
               <a:t>Showing how easy it is to “extract” </a:t>
             </a:r>
             <a:r>
-              <a:rPr lang="en-US" dirty="0" err="1" smtClean="0"/>
+              <a:rPr lang="en-US" dirty="0" err="1"/>
               <a:t>css</a:t>
             </a:r>
             <a:r>
-              <a:rPr lang="en-US" dirty="0" smtClean="0"/>
+              <a:rPr lang="en-US" dirty="0"/>
               <a:t> data</a:t>
             </a:r>
           </a:p>
           <a:p>
             <a:r>
-              <a:rPr lang="en-US" dirty="0" smtClean="0"/>
+              <a:rPr lang="en-US" dirty="0"/>
               <a:t>Show how to manipulate </a:t>
             </a:r>
             <a:r>
-              <a:rPr lang="en-US" dirty="0" err="1" smtClean="0"/>
+              <a:rPr lang="en-US" dirty="0" err="1"/>
               <a:t>css</a:t>
             </a:r>
             <a:r>
-              <a:rPr lang="en-US" dirty="0" smtClean="0"/>
+              <a:rPr lang="en-US" dirty="0"/>
               <a:t> or html directly through the DOM</a:t>
             </a:r>
-            <a:endParaRPr lang="en-US" dirty="0"/>
           </a:p>
         </p:txBody>
       </p:sp>
@@ -4988,10 +4966,9 @@
           <a:lstStyle/>
           <a:p>
             <a:r>
-              <a:rPr lang="en-US" dirty="0" smtClean="0"/>
+              <a:rPr lang="en-US" dirty="0"/>
               <a:t>Explain the DOM and Console: your best friends</a:t>
             </a:r>
-            <a:endParaRPr lang="en-US" dirty="0"/>
           </a:p>
         </p:txBody>
       </p:sp>
@@ -5011,22 +4988,21 @@
           <a:lstStyle/>
           <a:p>
             <a:r>
-              <a:rPr lang="en-US" dirty="0" smtClean="0"/>
+              <a:rPr lang="en-US" dirty="0"/>
               <a:t>Show the inspection properties for an element and talk about what that means</a:t>
             </a:r>
           </a:p>
           <a:p>
             <a:r>
-              <a:rPr lang="en-US" dirty="0" smtClean="0"/>
+              <a:rPr lang="en-US" dirty="0"/>
               <a:t>Show where the console is</a:t>
             </a:r>
           </a:p>
           <a:p>
             <a:r>
-              <a:rPr lang="en-US" dirty="0" smtClean="0"/>
+              <a:rPr lang="en-US" dirty="0"/>
               <a:t>Type a few things into the console</a:t>
             </a:r>
-            <a:endParaRPr lang="en-US" dirty="0"/>
           </a:p>
         </p:txBody>
       </p:sp>
@@ -5076,10 +5052,9 @@
           <a:lstStyle/>
           <a:p>
             <a:r>
-              <a:rPr lang="en-US" dirty="0" smtClean="0"/>
+              <a:rPr lang="en-US" dirty="0"/>
               <a:t>JavaScript Basics</a:t>
             </a:r>
-            <a:endParaRPr lang="en-US" dirty="0"/>
           </a:p>
         </p:txBody>
       </p:sp>
@@ -5101,57 +5076,57 @@
           <a:lstStyle/>
           <a:p>
             <a:r>
-              <a:rPr lang="en-US" dirty="0" smtClean="0"/>
+              <a:rPr lang="en-US" dirty="0"/>
               <a:t>JS documentation is deep and varied, and different browser companies will document their own usage</a:t>
             </a:r>
           </a:p>
           <a:p>
             <a:r>
-              <a:rPr lang="en-US" dirty="0" smtClean="0"/>
+              <a:rPr lang="en-US" dirty="0"/>
               <a:t>The best for web standards is Mozilla’s documentation at MDN (they show references to ECMAScript)</a:t>
             </a:r>
           </a:p>
           <a:p>
             <a:r>
-              <a:rPr lang="en-US" dirty="0" err="1" smtClean="0"/>
+              <a:rPr lang="en-US" dirty="0" err="1"/>
               <a:t>Javascript</a:t>
             </a:r>
             <a:r>
-              <a:rPr lang="en-US" dirty="0" smtClean="0"/>
+              <a:rPr lang="en-US" dirty="0"/>
               <a:t> is used in Node, electron, adobe acrobat, and Apache’s </a:t>
             </a:r>
             <a:r>
-              <a:rPr lang="en-US" dirty="0" err="1" smtClean="0"/>
+              <a:rPr lang="en-US" dirty="0" err="1"/>
               <a:t>CouchDB</a:t>
             </a:r>
             <a:r>
-              <a:rPr lang="en-US" dirty="0" smtClean="0"/>
+              <a:rPr lang="en-US" dirty="0"/>
               <a:t> (not just web pages!)</a:t>
             </a:r>
           </a:p>
           <a:p>
             <a:r>
-              <a:rPr lang="en-US" dirty="0" err="1" smtClean="0"/>
+              <a:rPr lang="en-US" dirty="0" err="1"/>
               <a:t>JSFiddle</a:t>
             </a:r>
             <a:r>
-              <a:rPr lang="en-US" dirty="0" smtClean="0"/>
+              <a:rPr lang="en-US" dirty="0"/>
               <a:t> (or </a:t>
             </a:r>
             <a:r>
-              <a:rPr lang="en-US" dirty="0" err="1" smtClean="0"/>
+              <a:rPr lang="en-US" dirty="0" err="1"/>
               <a:t>JSBin</a:t>
             </a:r>
             <a:r>
-              <a:rPr lang="en-US" dirty="0" smtClean="0"/>
+              <a:rPr lang="en-US" dirty="0"/>
               <a:t>) are the best for live-testing </a:t>
             </a:r>
             <a:r>
-              <a:rPr lang="en-US" dirty="0" err="1" smtClean="0"/>
+              <a:rPr lang="en-US" dirty="0" err="1"/>
               <a:t>js</a:t>
             </a:r>
             <a:r>
-              <a:rPr lang="en-US" dirty="0" smtClean="0"/>
+              <a:rPr lang="en-US" dirty="0"/>
               <a:t> in small functions or snippets</a:t>
             </a:r>
           </a:p>
@@ -5203,10 +5178,9 @@
           <a:lstStyle/>
           <a:p>
             <a:r>
-              <a:rPr lang="en-US" dirty="0" smtClean="0"/>
+              <a:rPr lang="en-US" dirty="0"/>
               <a:t>JavaScript 2.0</a:t>
             </a:r>
-            <a:endParaRPr lang="en-US" dirty="0"/>
           </a:p>
         </p:txBody>
       </p:sp>
@@ -5226,60 +5200,59 @@
           <a:lstStyle/>
           <a:p>
             <a:r>
-              <a:rPr lang="en-US" dirty="0" smtClean="0"/>
+              <a:rPr lang="en-US" dirty="0"/>
               <a:t>Write to the “document” using JS &amp; the console</a:t>
             </a:r>
           </a:p>
           <a:p>
             <a:r>
-              <a:rPr lang="en-US" dirty="0" smtClean="0"/>
+              <a:rPr lang="en-US" dirty="0"/>
               <a:t>Inspect the element in HTML/CSS</a:t>
             </a:r>
           </a:p>
           <a:p>
             <a:r>
-              <a:rPr lang="en-US" dirty="0" smtClean="0"/>
+              <a:rPr lang="en-US" dirty="0"/>
               <a:t>Access the element using JavaScript</a:t>
             </a:r>
           </a:p>
           <a:p>
             <a:r>
-              <a:rPr lang="en-US" dirty="0" smtClean="0"/>
+              <a:rPr lang="en-US" dirty="0"/>
               <a:t>View the properties of the element in the console</a:t>
             </a:r>
           </a:p>
           <a:p>
             <a:r>
-              <a:rPr lang="en-US" dirty="0" smtClean="0"/>
+              <a:rPr lang="en-US" dirty="0"/>
               <a:t>Edit the </a:t>
             </a:r>
             <a:r>
-              <a:rPr lang="en-US" dirty="0" err="1" smtClean="0"/>
+              <a:rPr lang="en-US" dirty="0" err="1"/>
               <a:t>innerhtml</a:t>
             </a:r>
             <a:r>
-              <a:rPr lang="en-US" dirty="0" smtClean="0"/>
+              <a:rPr lang="en-US" dirty="0"/>
               <a:t> of the element</a:t>
             </a:r>
           </a:p>
           <a:p>
             <a:r>
-              <a:rPr lang="en-US" dirty="0" smtClean="0"/>
+              <a:rPr lang="en-US" dirty="0"/>
               <a:t>Create a new element using JavaScript</a:t>
             </a:r>
           </a:p>
           <a:p>
             <a:r>
-              <a:rPr lang="en-US" dirty="0" smtClean="0"/>
+              <a:rPr lang="en-US" dirty="0"/>
               <a:t>Assign a class to the new element</a:t>
             </a:r>
           </a:p>
           <a:p>
             <a:r>
-              <a:rPr lang="en-US" dirty="0" smtClean="0"/>
+              <a:rPr lang="en-US" dirty="0"/>
               <a:t>Adjust the style using JavaScript, show it as inline</a:t>
             </a:r>
-            <a:endParaRPr lang="en-US" dirty="0"/>
           </a:p>
         </p:txBody>
       </p:sp>
@@ -5329,104 +5302,98 @@
           <a:lstStyle/>
           <a:p>
             <a:r>
-              <a:rPr lang="en-US" dirty="0" smtClean="0"/>
+              <a:rPr lang="en-US" dirty="0"/>
               <a:t>Challenge #2</a:t>
             </a:r>
+          </a:p>
+        </p:txBody>
+      </p:sp>
+      <p:sp>
+        <p:nvSpPr>
+          <p:cNvPr id="3" name="Content Placeholder 2"/>
+          <p:cNvSpPr>
+            <a:spLocks noGrp="1"/>
+          </p:cNvSpPr>
+          <p:nvPr>
+            <p:ph idx="1"/>
+          </p:nvPr>
+        </p:nvSpPr>
+        <p:spPr/>
+        <p:txBody>
+          <a:bodyPr/>
+          <a:lstStyle/>
+          <a:p>
+            <a:r>
+              <a:rPr lang="en-US" dirty="0"/>
+              <a:t>Go to google.com</a:t>
+            </a:r>
+          </a:p>
+          <a:p>
+            <a:r>
+              <a:rPr lang="en-US" dirty="0"/>
+              <a:t>Change the background color to “</a:t>
+            </a:r>
+            <a:r>
+              <a:rPr lang="en-US" dirty="0" err="1"/>
+              <a:t>lemonchiffon</a:t>
+            </a:r>
+            <a:r>
+              <a:rPr lang="en-US" dirty="0"/>
+              <a:t>”</a:t>
+            </a:r>
+          </a:p>
+          <a:p>
             <a:endParaRPr lang="en-US" dirty="0"/>
           </a:p>
-        </p:txBody>
-      </p:sp>
-      <p:sp>
-        <p:nvSpPr>
-          <p:cNvPr id="3" name="Content Placeholder 2"/>
-          <p:cNvSpPr>
-            <a:spLocks noGrp="1"/>
-          </p:cNvSpPr>
-          <p:nvPr>
-            <p:ph idx="1"/>
-          </p:nvPr>
-        </p:nvSpPr>
-        <p:spPr/>
-        <p:txBody>
-          <a:bodyPr/>
-          <a:lstStyle/>
-          <a:p>
-            <a:r>
-              <a:rPr lang="en-US" dirty="0" smtClean="0"/>
-              <a:t>Go to google.com</a:t>
-            </a:r>
-          </a:p>
-          <a:p>
-            <a:r>
-              <a:rPr lang="en-US" dirty="0" smtClean="0"/>
-              <a:t>Change the background color to “</a:t>
-            </a:r>
-            <a:r>
-              <a:rPr lang="en-US" dirty="0" err="1" smtClean="0"/>
-              <a:t>lemonchiffon</a:t>
-            </a:r>
-            <a:r>
-              <a:rPr lang="en-US" dirty="0" smtClean="0"/>
-              <a:t>”</a:t>
-            </a:r>
-          </a:p>
-          <a:p>
-            <a:endParaRPr lang="en-US" dirty="0" smtClean="0"/>
-          </a:p>
-          <a:p>
-            <a:r>
-              <a:rPr lang="en-US" dirty="0" smtClean="0"/>
+          <a:p>
+            <a:r>
+              <a:rPr lang="en-US" dirty="0"/>
               <a:t>Bonus:</a:t>
             </a:r>
+          </a:p>
+          <a:p>
+            <a:pPr lvl="1"/>
+            <a:r>
+              <a:rPr lang="en-US" dirty="0"/>
+              <a:t>Change the header image to this image and fix the styling:</a:t>
+            </a:r>
+          </a:p>
+          <a:p>
+            <a:pPr lvl="2"/>
+            <a:r>
+              <a:rPr lang="en-US" sz="2800" b="1" dirty="0"/>
+              <a:t>https://bit.ly/2FRr8L1</a:t>
+            </a:r>
+          </a:p>
+          <a:p>
+            <a:pPr lvl="2"/>
+            <a:r>
+              <a:rPr lang="en-US" dirty="0"/>
+              <a:t>Hint: remove the “</a:t>
+            </a:r>
+            <a:r>
+              <a:rPr lang="en-US" dirty="0" err="1"/>
+              <a:t>srcset</a:t>
+            </a:r>
+            <a:r>
+              <a:rPr lang="en-US" dirty="0"/>
+              <a:t>” tag altogether and just use </a:t>
+            </a:r>
+            <a:r>
+              <a:rPr lang="en-US" dirty="0" err="1"/>
+              <a:t>src</a:t>
+            </a:r>
+            <a:r>
+              <a:rPr lang="en-US" dirty="0"/>
+              <a:t>, height, and width</a:t>
+            </a:r>
+          </a:p>
+          <a:p>
             <a:endParaRPr lang="en-US" dirty="0"/>
           </a:p>
           <a:p>
-            <a:pPr lvl="1"/>
-            <a:r>
-              <a:rPr lang="en-US" dirty="0" smtClean="0"/>
-              <a:t>Change the header image to this image and fix the styling:</a:t>
-            </a:r>
-          </a:p>
-          <a:p>
-            <a:pPr lvl="2"/>
-            <a:r>
-              <a:rPr lang="en-US" sz="2800" b="1" dirty="0"/>
-              <a:t>https://</a:t>
-            </a:r>
-            <a:r>
-              <a:rPr lang="en-US" sz="2800" b="1" dirty="0" smtClean="0"/>
-              <a:t>bit.ly/2FRr8L1</a:t>
-            </a:r>
-          </a:p>
-          <a:p>
-            <a:pPr lvl="2"/>
-            <a:r>
-              <a:rPr lang="en-US" dirty="0" smtClean="0"/>
-              <a:t>Hint: remove the “</a:t>
-            </a:r>
-            <a:r>
-              <a:rPr lang="en-US" dirty="0" err="1" smtClean="0"/>
-              <a:t>srcset</a:t>
-            </a:r>
-            <a:r>
-              <a:rPr lang="en-US" dirty="0" smtClean="0"/>
-              <a:t>” tag altogether and just use </a:t>
-            </a:r>
-            <a:r>
-              <a:rPr lang="en-US" dirty="0" err="1" smtClean="0"/>
-              <a:t>src</a:t>
-            </a:r>
-            <a:r>
-              <a:rPr lang="en-US" dirty="0" smtClean="0"/>
-              <a:t>, height, and width</a:t>
-            </a:r>
-          </a:p>
-          <a:p>
-            <a:endParaRPr lang="en-US" dirty="0" smtClean="0"/>
-          </a:p>
-          <a:p>
-            <a:r>
-              <a:rPr lang="en-US" dirty="0" smtClean="0"/>
+            <a:r>
+              <a:rPr lang="en-US" dirty="0"/>
               <a:t>Solution is in the “answers” folder</a:t>
             </a:r>
           </a:p>
@@ -5478,10 +5445,9 @@
           <a:lstStyle/>
           <a:p>
             <a:r>
-              <a:rPr lang="en-US" dirty="0" smtClean="0"/>
+              <a:rPr lang="en-US" dirty="0"/>
               <a:t>Optional Content</a:t>
             </a:r>
-            <a:endParaRPr lang="en-US" dirty="0"/>
           </a:p>
         </p:txBody>
       </p:sp>
@@ -5501,10 +5467,9 @@
           <a:lstStyle/>
           <a:p>
             <a:r>
-              <a:rPr lang="en-US" dirty="0" smtClean="0"/>
+              <a:rPr lang="en-US" dirty="0"/>
               <a:t>Content after this slide extends the workshop to 2.5-3 hours.</a:t>
             </a:r>
-            <a:endParaRPr lang="en-US" dirty="0"/>
           </a:p>
         </p:txBody>
       </p:sp>
@@ -5554,73 +5519,67 @@
           <a:lstStyle/>
           <a:p>
             <a:r>
-              <a:rPr lang="en-US" dirty="0" err="1" smtClean="0"/>
-              <a:t>Javascript</a:t>
-            </a:r>
-            <a:r>
-              <a:rPr lang="en-US" dirty="0" smtClean="0"/>
-              <a:t> basics 3.0</a:t>
-            </a:r>
-            <a:endParaRPr lang="en-US" dirty="0"/>
-          </a:p>
-        </p:txBody>
-      </p:sp>
-      <p:sp>
-        <p:nvSpPr>
-          <p:cNvPr id="3" name="Content Placeholder 2"/>
-          <p:cNvSpPr>
-            <a:spLocks noGrp="1"/>
-          </p:cNvSpPr>
-          <p:nvPr>
-            <p:ph idx="1"/>
-          </p:nvPr>
-        </p:nvSpPr>
-        <p:spPr/>
-        <p:txBody>
-          <a:bodyPr/>
-          <a:lstStyle/>
-          <a:p>
-            <a:r>
-              <a:rPr lang="en-US" dirty="0"/>
-              <a:t>Show basic buttons and looping and the differences of html-triggered JS, event binding, and event listening</a:t>
-            </a:r>
-          </a:p>
-          <a:p>
-            <a:r>
-              <a:rPr lang="en-US" dirty="0"/>
-              <a:t>Show event triggers passing as parameters</a:t>
-            </a:r>
-          </a:p>
-          <a:p>
-            <a:r>
-              <a:rPr lang="en-US" dirty="0"/>
-              <a:t>Explain how </a:t>
-            </a:r>
-            <a:r>
               <a:rPr lang="en-US" dirty="0" err="1"/>
               <a:t>Javascript</a:t>
             </a:r>
             <a:r>
               <a:rPr lang="en-US" dirty="0"/>
+              <a:t> basics 3.0</a:t>
+            </a:r>
+          </a:p>
+        </p:txBody>
+      </p:sp>
+      <p:sp>
+        <p:nvSpPr>
+          <p:cNvPr id="3" name="Content Placeholder 2"/>
+          <p:cNvSpPr>
+            <a:spLocks noGrp="1"/>
+          </p:cNvSpPr>
+          <p:nvPr>
+            <p:ph idx="1"/>
+          </p:nvPr>
+        </p:nvSpPr>
+        <p:spPr/>
+        <p:txBody>
+          <a:bodyPr/>
+          <a:lstStyle/>
+          <a:p>
+            <a:r>
+              <a:rPr lang="en-US" dirty="0"/>
+              <a:t>Show basic buttons and looping and the differences of html-triggered JS, event binding, and event listening</a:t>
+            </a:r>
+          </a:p>
+          <a:p>
+            <a:r>
+              <a:rPr lang="en-US" dirty="0"/>
+              <a:t>Show event triggers passing as parameters</a:t>
+            </a:r>
+          </a:p>
+          <a:p>
+            <a:r>
+              <a:rPr lang="en-US" dirty="0"/>
+              <a:t>Explain how </a:t>
+            </a:r>
+            <a:r>
+              <a:rPr lang="en-US" dirty="0" err="1"/>
+              <a:t>Javascript</a:t>
+            </a:r>
+            <a:r>
+              <a:rPr lang="en-US" dirty="0"/>
               <a:t> passes some parameters explicitly (you just have to learn what these are</a:t>
             </a:r>
           </a:p>
           <a:p>
             <a:r>
               <a:rPr lang="en-US" dirty="0"/>
-              <a:t>Show the problem with triggering events on parent </a:t>
-            </a:r>
-            <a:r>
-              <a:rPr lang="en-US" dirty="0" smtClean="0"/>
-              <a:t>elements</a:t>
-            </a:r>
-          </a:p>
-          <a:p>
-            <a:r>
-              <a:rPr lang="en-US" dirty="0" smtClean="0"/>
+              <a:t>Show the problem with triggering events on parent elements</a:t>
+            </a:r>
+          </a:p>
+          <a:p>
+            <a:r>
+              <a:rPr lang="en-US" dirty="0"/>
               <a:t>Build a basic form with a text input and submit button</a:t>
             </a:r>
-            <a:endParaRPr lang="en-US" dirty="0"/>
           </a:p>
         </p:txBody>
       </p:sp>
@@ -5670,10 +5629,9 @@
           <a:lstStyle/>
           <a:p>
             <a:r>
-              <a:rPr lang="en-US" dirty="0" smtClean="0"/>
+              <a:rPr lang="en-US" dirty="0"/>
               <a:t>3 Things:</a:t>
             </a:r>
-            <a:endParaRPr lang="en-US" dirty="0"/>
           </a:p>
         </p:txBody>
       </p:sp>
@@ -5699,26 +5657,21 @@
               <a:t>The repository is here: </a:t>
             </a:r>
             <a:r>
-              <a:rPr lang="en-US" sz="4000" b="1" dirty="0"/>
-              <a:t>http://</a:t>
-            </a:r>
-            <a:r>
-              <a:rPr lang="en-US" sz="4000" b="1" dirty="0" smtClean="0"/>
-              <a:t>bit.ly/2mRzSc3</a:t>
-            </a:r>
-          </a:p>
-          <a:p>
-            <a:r>
-              <a:rPr lang="en-US" sz="4000" dirty="0" smtClean="0"/>
+              <a:rPr lang="en-US" sz="6000" b="1" dirty="0"/>
+              <a:t>https://bit.ly/intro_to_web</a:t>
+            </a:r>
+          </a:p>
+          <a:p>
+            <a:r>
+              <a:rPr lang="en-US" sz="4000" dirty="0"/>
               <a:t>W3 Schools – a great resource for HTML/CSS and a little JS</a:t>
             </a:r>
           </a:p>
           <a:p>
             <a:r>
-              <a:rPr lang="en-US" sz="4000" dirty="0" smtClean="0"/>
+              <a:rPr lang="en-US" sz="4000" dirty="0"/>
               <a:t>MDN (Mozilla Developer Network) – Best ECMAScript/JavaScript reference out there</a:t>
             </a:r>
-            <a:endParaRPr lang="en-US" sz="4000" dirty="0"/>
           </a:p>
         </p:txBody>
       </p:sp>
@@ -5768,10 +5721,9 @@
           <a:lstStyle/>
           <a:p>
             <a:r>
-              <a:rPr lang="en-US" dirty="0" smtClean="0"/>
+              <a:rPr lang="en-US" dirty="0"/>
               <a:t>Challenge #3</a:t>
             </a:r>
-            <a:endParaRPr lang="en-US" dirty="0"/>
           </a:p>
         </p:txBody>
       </p:sp>
@@ -5791,13 +5743,13 @@
           <a:lstStyle/>
           <a:p>
             <a:r>
-              <a:rPr lang="en-US" dirty="0" smtClean="0"/>
+              <a:rPr lang="en-US" dirty="0"/>
               <a:t>Go to google.com</a:t>
             </a:r>
           </a:p>
           <a:p>
             <a:r>
-              <a:rPr lang="en-US" dirty="0" smtClean="0"/>
+              <a:rPr lang="en-US" dirty="0"/>
               <a:t>Add a button called “Dog Search” to the page that automatically puts “dog” in the search input and submits</a:t>
             </a:r>
           </a:p>
@@ -5850,10 +5802,9 @@
           <a:p>
             <a:pPr algn="ctr"/>
             <a:r>
-              <a:rPr lang="en-US" dirty="0" smtClean="0"/>
+              <a:rPr lang="en-US" dirty="0"/>
               <a:t>What the heck is “web technology”?</a:t>
             </a:r>
-            <a:endParaRPr lang="en-US" dirty="0"/>
           </a:p>
         </p:txBody>
       </p:sp>
@@ -6098,7 +6049,7 @@
               <a:defRPr/>
             </a:pPr>
             <a:r>
-              <a:rPr kumimoji="0" lang="en-US" sz="1800" b="0" i="0" u="none" strike="noStrike" kern="1200" cap="none" spc="0" normalizeH="0" baseline="0" noProof="0" dirty="0" smtClean="0">
+              <a:rPr kumimoji="0" lang="en-US" sz="1800" b="0" i="0" u="none" strike="noStrike" kern="1200" cap="none" spc="0" normalizeH="0" baseline="0" noProof="0" dirty="0">
                 <a:ln>
                   <a:noFill/>
                 </a:ln>
@@ -6134,7 +6085,7 @@
               <a:defRPr/>
             </a:pPr>
             <a:r>
-              <a:rPr kumimoji="0" lang="en-US" sz="1800" b="0" i="0" u="none" strike="noStrike" kern="1200" cap="none" spc="0" normalizeH="0" baseline="0" noProof="0" dirty="0" smtClean="0">
+              <a:rPr kumimoji="0" lang="en-US" sz="1800" b="0" i="0" u="none" strike="noStrike" kern="1200" cap="none" spc="0" normalizeH="0" baseline="0" noProof="0" dirty="0">
                 <a:ln>
                   <a:noFill/>
                 </a:ln>
@@ -6151,7 +6102,7 @@
               <a:t>An </a:t>
             </a:r>
             <a:r>
-              <a:rPr kumimoji="0" lang="en-US" sz="1800" b="0" i="1" u="none" strike="noStrike" kern="1200" cap="none" spc="0" normalizeH="0" baseline="0" noProof="0" dirty="0" smtClean="0">
+              <a:rPr kumimoji="0" lang="en-US" sz="1800" b="0" i="1" u="none" strike="noStrike" kern="1200" cap="none" spc="0" normalizeH="0" baseline="0" noProof="0" dirty="0">
                 <a:ln>
                   <a:noFill/>
                 </a:ln>
@@ -6168,7 +6119,7 @@
               <a:t>optional</a:t>
             </a:r>
             <a:r>
-              <a:rPr kumimoji="0" lang="en-US" sz="1800" b="0" i="0" u="none" strike="noStrike" kern="1200" cap="none" spc="0" normalizeH="0" baseline="0" noProof="0" dirty="0" smtClean="0">
+              <a:rPr kumimoji="0" lang="en-US" sz="1800" b="0" i="0" u="none" strike="noStrike" kern="1200" cap="none" spc="0" normalizeH="0" baseline="0" noProof="0" dirty="0">
                 <a:ln>
                   <a:noFill/>
                 </a:ln>
@@ -6184,20 +6135,6 @@
               </a:rPr>
               <a:t> package, library, methodology, or pattern that determines how these all interact</a:t>
             </a:r>
-            <a:endParaRPr kumimoji="0" lang="en-US" sz="1800" b="0" i="0" u="none" strike="noStrike" kern="1200" cap="none" spc="0" normalizeH="0" baseline="0" noProof="0" dirty="0">
-              <a:ln>
-                <a:noFill/>
-              </a:ln>
-              <a:solidFill>
-                <a:prstClr val="white"/>
-              </a:solidFill>
-              <a:effectLst/>
-              <a:uLnTx/>
-              <a:uFillTx/>
-              <a:latin typeface="Palatino Linotype" panose="02040502050505030304"/>
-              <a:ea typeface="+mn-ea"/>
-              <a:cs typeface="+mn-cs"/>
-            </a:endParaRPr>
           </a:p>
         </p:txBody>
       </p:sp>
@@ -6263,7 +6200,7 @@
               <a:defRPr/>
             </a:pPr>
             <a:r>
-              <a:rPr kumimoji="0" lang="en-US" sz="1800" b="1" i="0" u="none" strike="noStrike" kern="1200" cap="none" spc="0" normalizeH="0" baseline="0" noProof="0" dirty="0" smtClean="0">
+              <a:rPr kumimoji="0" lang="en-US" sz="1800" b="1" i="0" u="none" strike="noStrike" kern="1200" cap="none" spc="0" normalizeH="0" baseline="0" noProof="0" dirty="0">
                 <a:ln>
                   <a:noFill/>
                 </a:ln>
@@ -6299,7 +6236,7 @@
               <a:defRPr/>
             </a:pPr>
             <a:r>
-              <a:rPr kumimoji="0" lang="en-US" sz="1800" b="0" i="0" u="none" strike="noStrike" kern="1200" cap="none" spc="0" normalizeH="0" baseline="0" noProof="0" dirty="0" smtClean="0">
+              <a:rPr kumimoji="0" lang="en-US" sz="1800" b="0" i="0" u="none" strike="noStrike" kern="1200" cap="none" spc="0" normalizeH="0" baseline="0" noProof="0" dirty="0">
                 <a:ln>
                   <a:noFill/>
                 </a:ln>
@@ -6315,20 +6252,6 @@
               </a:rPr>
               <a:t>What the user sees</a:t>
             </a:r>
-            <a:endParaRPr kumimoji="0" lang="en-US" sz="1800" b="0" i="0" u="none" strike="noStrike" kern="1200" cap="none" spc="0" normalizeH="0" baseline="0" noProof="0" dirty="0">
-              <a:ln>
-                <a:noFill/>
-              </a:ln>
-              <a:solidFill>
-                <a:prstClr val="black"/>
-              </a:solidFill>
-              <a:effectLst/>
-              <a:uLnTx/>
-              <a:uFillTx/>
-              <a:latin typeface="Palatino Linotype" panose="02040502050505030304"/>
-              <a:ea typeface="+mn-ea"/>
-              <a:cs typeface="+mn-cs"/>
-            </a:endParaRPr>
           </a:p>
         </p:txBody>
       </p:sp>
@@ -6394,7 +6317,7 @@
               <a:defRPr/>
             </a:pPr>
             <a:r>
-              <a:rPr kumimoji="0" lang="en-US" sz="1800" b="1" i="0" u="none" strike="noStrike" kern="1200" cap="none" spc="0" normalizeH="0" baseline="0" noProof="0" dirty="0" smtClean="0">
+              <a:rPr kumimoji="0" lang="en-US" sz="1800" b="1" i="0" u="none" strike="noStrike" kern="1200" cap="none" spc="0" normalizeH="0" baseline="0" noProof="0" dirty="0">
                 <a:ln>
                   <a:noFill/>
                 </a:ln>
@@ -6430,7 +6353,7 @@
               <a:defRPr/>
             </a:pPr>
             <a:r>
-              <a:rPr kumimoji="0" lang="en-US" sz="1800" b="0" i="0" u="none" strike="noStrike" kern="1200" cap="none" spc="0" normalizeH="0" baseline="0" noProof="0" dirty="0" smtClean="0">
+              <a:rPr kumimoji="0" lang="en-US" sz="1800" b="0" i="0" u="none" strike="noStrike" kern="1200" cap="none" spc="0" normalizeH="0" baseline="0" noProof="0" dirty="0">
                 <a:ln>
                   <a:noFill/>
                 </a:ln>
@@ -6446,20 +6369,6 @@
               </a:rPr>
               <a:t>What the user does not see</a:t>
             </a:r>
-            <a:endParaRPr kumimoji="0" lang="en-US" sz="1800" b="0" i="0" u="none" strike="noStrike" kern="1200" cap="none" spc="0" normalizeH="0" baseline="0" noProof="0" dirty="0">
-              <a:ln>
-                <a:noFill/>
-              </a:ln>
-              <a:solidFill>
-                <a:prstClr val="black"/>
-              </a:solidFill>
-              <a:effectLst/>
-              <a:uLnTx/>
-              <a:uFillTx/>
-              <a:latin typeface="Palatino Linotype" panose="02040502050505030304"/>
-              <a:ea typeface="+mn-ea"/>
-              <a:cs typeface="+mn-cs"/>
-            </a:endParaRPr>
           </a:p>
         </p:txBody>
       </p:sp>
@@ -6606,7 +6515,7 @@
               <a:defRPr/>
             </a:pPr>
             <a:r>
-              <a:rPr kumimoji="0" lang="en-US" sz="1800" b="1" i="0" u="none" strike="noStrike" kern="1200" cap="none" spc="0" normalizeH="0" baseline="0" noProof="0" dirty="0" smtClean="0">
+              <a:rPr kumimoji="0" lang="en-US" sz="1800" b="1" i="0" u="none" strike="noStrike" kern="1200" cap="none" spc="0" normalizeH="0" baseline="0" noProof="0" dirty="0">
                 <a:ln>
                   <a:noFill/>
                 </a:ln>
@@ -6623,7 +6532,7 @@
               <a:t>Client-side: </a:t>
             </a:r>
             <a:r>
-              <a:rPr kumimoji="0" lang="en-US" sz="1800" b="0" i="0" u="none" strike="noStrike" kern="1200" cap="none" spc="0" normalizeH="0" baseline="0" noProof="0" dirty="0" smtClean="0">
+              <a:rPr kumimoji="0" lang="en-US" sz="1800" b="0" i="0" u="none" strike="noStrike" kern="1200" cap="none" spc="0" normalizeH="0" baseline="0" noProof="0" dirty="0">
                 <a:ln>
                   <a:noFill/>
                 </a:ln>
@@ -6639,20 +6548,6 @@
               </a:rPr>
               <a:t>the physical location of the technology the user interacts with.</a:t>
             </a:r>
-            <a:endParaRPr kumimoji="0" lang="en-US" sz="1800" b="0" i="0" u="none" strike="noStrike" kern="1200" cap="none" spc="0" normalizeH="0" baseline="0" noProof="0" dirty="0">
-              <a:ln>
-                <a:noFill/>
-              </a:ln>
-              <a:solidFill>
-                <a:prstClr val="black"/>
-              </a:solidFill>
-              <a:effectLst/>
-              <a:uLnTx/>
-              <a:uFillTx/>
-              <a:latin typeface="Palatino Linotype" panose="02040502050505030304"/>
-              <a:ea typeface="+mn-ea"/>
-              <a:cs typeface="+mn-cs"/>
-            </a:endParaRPr>
           </a:p>
         </p:txBody>
       </p:sp>
@@ -6722,7 +6617,7 @@
               <a:defRPr/>
             </a:pPr>
             <a:r>
-              <a:rPr kumimoji="0" lang="en-US" sz="1800" b="1" i="0" u="none" strike="noStrike" kern="1200" cap="none" spc="0" normalizeH="0" baseline="0" noProof="0" dirty="0" smtClean="0">
+              <a:rPr kumimoji="0" lang="en-US" sz="1800" b="1" i="0" u="none" strike="noStrike" kern="1200" cap="none" spc="0" normalizeH="0" baseline="0" noProof="0" dirty="0">
                 <a:ln>
                   <a:noFill/>
                 </a:ln>
@@ -6739,7 +6634,7 @@
               <a:t>Server-side: </a:t>
             </a:r>
             <a:r>
-              <a:rPr kumimoji="0" lang="en-US" sz="1800" b="0" i="0" u="none" strike="noStrike" kern="1200" cap="none" spc="0" normalizeH="0" baseline="0" noProof="0" dirty="0" smtClean="0">
+              <a:rPr kumimoji="0" lang="en-US" sz="1800" b="0" i="0" u="none" strike="noStrike" kern="1200" cap="none" spc="0" normalizeH="0" baseline="0" noProof="0" dirty="0">
                 <a:ln>
                   <a:noFill/>
                 </a:ln>
@@ -6838,7 +6733,7 @@
               <a:defRPr/>
             </a:pPr>
             <a:r>
-              <a:rPr kumimoji="0" lang="en-US" sz="1800" b="1" i="0" u="none" strike="noStrike" kern="1200" cap="none" spc="0" normalizeH="0" baseline="0" noProof="0" dirty="0" smtClean="0">
+              <a:rPr kumimoji="0" lang="en-US" sz="1800" b="1" i="0" u="none" strike="noStrike" kern="1200" cap="none" spc="0" normalizeH="0" baseline="0" noProof="0" dirty="0">
                 <a:ln>
                   <a:noFill/>
                 </a:ln>
@@ -6855,7 +6750,7 @@
               <a:t>Database: </a:t>
             </a:r>
             <a:r>
-              <a:rPr kumimoji="0" lang="en-US" sz="1800" b="0" i="0" u="none" strike="noStrike" kern="1200" cap="none" spc="0" normalizeH="0" baseline="0" noProof="0" dirty="0" smtClean="0">
+              <a:rPr kumimoji="0" lang="en-US" sz="1800" b="0" i="0" u="none" strike="noStrike" kern="1200" cap="none" spc="0" normalizeH="0" baseline="0" noProof="0" dirty="0">
                 <a:ln>
                   <a:noFill/>
                 </a:ln>
@@ -6871,20 +6766,6 @@
               </a:rPr>
               <a:t>the physical location of the technology that handles data storage</a:t>
             </a:r>
-            <a:endParaRPr kumimoji="0" lang="en-US" sz="1800" b="0" i="0" u="none" strike="noStrike" kern="1200" cap="none" spc="0" normalizeH="0" baseline="0" noProof="0" dirty="0">
-              <a:ln>
-                <a:noFill/>
-              </a:ln>
-              <a:solidFill>
-                <a:prstClr val="black"/>
-              </a:solidFill>
-              <a:effectLst/>
-              <a:uLnTx/>
-              <a:uFillTx/>
-              <a:latin typeface="Palatino Linotype" panose="02040502050505030304"/>
-              <a:ea typeface="+mn-ea"/>
-              <a:cs typeface="+mn-cs"/>
-            </a:endParaRPr>
           </a:p>
         </p:txBody>
       </p:sp>
@@ -7343,7 +7224,7 @@
           <a:p>
             <a:pPr algn="ctr"/>
             <a:r>
-              <a:rPr lang="en-US" sz="8000" dirty="0" smtClean="0"/>
+              <a:rPr lang="en-US" sz="8000" dirty="0"/>
               <a:t>Walkthrough</a:t>
             </a:r>
             <a:endParaRPr lang="en-US" dirty="0"/>
@@ -7396,10 +7277,9 @@
           <a:lstStyle/>
           <a:p>
             <a:r>
-              <a:rPr lang="en-US" dirty="0" smtClean="0"/>
+              <a:rPr lang="en-US" dirty="0"/>
               <a:t>HTML Basics</a:t>
             </a:r>
-            <a:endParaRPr lang="en-US" dirty="0"/>
           </a:p>
         </p:txBody>
       </p:sp>
@@ -7419,37 +7299,37 @@
           <a:lstStyle/>
           <a:p>
             <a:r>
-              <a:rPr lang="en-US" dirty="0" smtClean="0"/>
+              <a:rPr lang="en-US" dirty="0"/>
               <a:t>Using a text editor to create a file that the browser can read</a:t>
             </a:r>
           </a:p>
           <a:p>
             <a:r>
-              <a:rPr lang="en-US" dirty="0" smtClean="0"/>
+              <a:rPr lang="en-US" dirty="0"/>
               <a:t>Inspecting the element in the browser, explaining elements</a:t>
             </a:r>
           </a:p>
           <a:p>
             <a:r>
-              <a:rPr lang="en-US" dirty="0" smtClean="0"/>
+              <a:rPr lang="en-US" dirty="0"/>
               <a:t>Recreating the file, this time with actual markup!</a:t>
             </a:r>
           </a:p>
           <a:p>
             <a:r>
-              <a:rPr lang="en-US" dirty="0" smtClean="0"/>
+              <a:rPr lang="en-US" dirty="0"/>
               <a:t>Inspecting the element again, showing how it is the same</a:t>
             </a:r>
           </a:p>
           <a:p>
             <a:r>
-              <a:rPr lang="en-US" dirty="0" smtClean="0"/>
+              <a:rPr lang="en-US" dirty="0"/>
               <a:t>Explaining what HTML stands for and what its purpose is</a:t>
             </a:r>
           </a:p>
           <a:p>
             <a:r>
-              <a:rPr lang="en-US" dirty="0" smtClean="0"/>
+              <a:rPr lang="en-US" dirty="0"/>
               <a:t>Showing what a basic HTML file could look like</a:t>
             </a:r>
           </a:p>

</xml_diff>